<commit_message>
Updated some outdated info.
</commit_message>
<xml_diff>
--- a/Entity Framework Extra Mile/IADNUG 20150306/EF Extra Mile.pptx
+++ b/Entity Framework Extra Mile/IADNUG 20150306/EF Extra Mile.pptx
@@ -278,7 +278,7 @@
           <a:p>
             <a:fld id="{856365B8-A905-4126-A305-28D558C34FD5}" type="datetimeFigureOut">
               <a:rPr lang="en-US" smtClean="0"/>
-              <a:t>6/3/2014</a:t>
+              <a:t>3/3/2015</a:t>
             </a:fld>
             <a:endParaRPr lang="en-US"/>
           </a:p>
@@ -448,7 +448,7 @@
           <a:p>
             <a:fld id="{856365B8-A905-4126-A305-28D558C34FD5}" type="datetimeFigureOut">
               <a:rPr lang="en-US" smtClean="0"/>
-              <a:t>6/3/2014</a:t>
+              <a:t>3/3/2015</a:t>
             </a:fld>
             <a:endParaRPr lang="en-US"/>
           </a:p>
@@ -628,7 +628,7 @@
           <a:p>
             <a:fld id="{856365B8-A905-4126-A305-28D558C34FD5}" type="datetimeFigureOut">
               <a:rPr lang="en-US" smtClean="0"/>
-              <a:t>6/3/2014</a:t>
+              <a:t>3/3/2015</a:t>
             </a:fld>
             <a:endParaRPr lang="en-US"/>
           </a:p>
@@ -798,7 +798,7 @@
           <a:p>
             <a:fld id="{856365B8-A905-4126-A305-28D558C34FD5}" type="datetimeFigureOut">
               <a:rPr lang="en-US" smtClean="0"/>
-              <a:t>6/3/2014</a:t>
+              <a:t>3/3/2015</a:t>
             </a:fld>
             <a:endParaRPr lang="en-US"/>
           </a:p>
@@ -1044,7 +1044,7 @@
           <a:p>
             <a:fld id="{856365B8-A905-4126-A305-28D558C34FD5}" type="datetimeFigureOut">
               <a:rPr lang="en-US" smtClean="0"/>
-              <a:t>6/3/2014</a:t>
+              <a:t>3/3/2015</a:t>
             </a:fld>
             <a:endParaRPr lang="en-US"/>
           </a:p>
@@ -1276,7 +1276,7 @@
           <a:p>
             <a:fld id="{856365B8-A905-4126-A305-28D558C34FD5}" type="datetimeFigureOut">
               <a:rPr lang="en-US" smtClean="0"/>
-              <a:t>6/3/2014</a:t>
+              <a:t>3/3/2015</a:t>
             </a:fld>
             <a:endParaRPr lang="en-US"/>
           </a:p>
@@ -1643,7 +1643,7 @@
           <a:p>
             <a:fld id="{856365B8-A905-4126-A305-28D558C34FD5}" type="datetimeFigureOut">
               <a:rPr lang="en-US" smtClean="0"/>
-              <a:t>6/3/2014</a:t>
+              <a:t>3/3/2015</a:t>
             </a:fld>
             <a:endParaRPr lang="en-US"/>
           </a:p>
@@ -1761,7 +1761,7 @@
           <a:p>
             <a:fld id="{856365B8-A905-4126-A305-28D558C34FD5}" type="datetimeFigureOut">
               <a:rPr lang="en-US" smtClean="0"/>
-              <a:t>6/3/2014</a:t>
+              <a:t>3/3/2015</a:t>
             </a:fld>
             <a:endParaRPr lang="en-US"/>
           </a:p>
@@ -1856,7 +1856,7 @@
           <a:p>
             <a:fld id="{856365B8-A905-4126-A305-28D558C34FD5}" type="datetimeFigureOut">
               <a:rPr lang="en-US" smtClean="0"/>
-              <a:t>6/3/2014</a:t>
+              <a:t>3/3/2015</a:t>
             </a:fld>
             <a:endParaRPr lang="en-US"/>
           </a:p>
@@ -2133,7 +2133,7 @@
           <a:p>
             <a:fld id="{856365B8-A905-4126-A305-28D558C34FD5}" type="datetimeFigureOut">
               <a:rPr lang="en-US" smtClean="0"/>
-              <a:t>6/3/2014</a:t>
+              <a:t>3/3/2015</a:t>
             </a:fld>
             <a:endParaRPr lang="en-US"/>
           </a:p>
@@ -2390,7 +2390,7 @@
           <a:p>
             <a:fld id="{856365B8-A905-4126-A305-28D558C34FD5}" type="datetimeFigureOut">
               <a:rPr lang="en-US" smtClean="0"/>
-              <a:t>6/3/2014</a:t>
+              <a:t>3/3/2015</a:t>
             </a:fld>
             <a:endParaRPr lang="en-US"/>
           </a:p>
@@ -2603,7 +2603,7 @@
           <a:p>
             <a:fld id="{856365B8-A905-4126-A305-28D558C34FD5}" type="datetimeFigureOut">
               <a:rPr lang="en-US" smtClean="0"/>
-              <a:t>6/3/2014</a:t>
+              <a:t>3/3/2015</a:t>
             </a:fld>
             <a:endParaRPr lang="en-US"/>
           </a:p>
@@ -3240,36 +3240,21 @@
             <a:pPr lvl="2"/>
             <a:r>
               <a:rPr lang="en-US" dirty="0" smtClean="0"/>
-              <a:t>Requires EF 6.1.1-beta1 (Still in beta)</a:t>
-            </a:r>
-          </a:p>
-          <a:p>
-            <a:pPr lvl="1"/>
-            <a:r>
-              <a:rPr lang="en-US" dirty="0" smtClean="0"/>
-              <a:t>Using </a:t>
-            </a:r>
-            <a:r>
-              <a:rPr lang="en-US" dirty="0" err="1" smtClean="0"/>
-              <a:t>EntityFramework.Filters</a:t>
-            </a:r>
-            <a:r>
-              <a:rPr lang="en-US" dirty="0" smtClean="0"/>
-              <a:t> package from Jimmy </a:t>
-            </a:r>
-            <a:r>
-              <a:rPr lang="en-US" dirty="0" err="1" smtClean="0"/>
-              <a:t>Bogard</a:t>
-            </a:r>
-            <a:r>
-              <a:rPr lang="en-US" dirty="0" smtClean="0"/>
-              <a:t> to enable turning off global filter programmatically</a:t>
-            </a:r>
-          </a:p>
-          <a:p>
-            <a:r>
-              <a:rPr lang="en-US" dirty="0" smtClean="0"/>
-              <a:t>Handle others in </a:t>
+              <a:t>Requires EF </a:t>
+            </a:r>
+            <a:r>
+              <a:rPr lang="en-US" dirty="0" smtClean="0"/>
+              <a:t>6.1.1+.</a:t>
+            </a:r>
+          </a:p>
+          <a:p>
+            <a:r>
+              <a:rPr lang="en-US" dirty="0" smtClean="0"/>
+              <a:t>Handle </a:t>
+            </a:r>
+            <a:r>
+              <a:rPr lang="en-US" dirty="0" smtClean="0"/>
+              <a:t>others in </a:t>
             </a:r>
             <a:r>
               <a:rPr lang="en-US" dirty="0" err="1" smtClean="0"/>
@@ -6329,8 +6314,32 @@
             </a:r>
             <a:r>
               <a:rPr lang="en-US" dirty="0" smtClean="0"/>
-              <a:t> scope</a:t>
-            </a:r>
+              <a:t> </a:t>
+            </a:r>
+            <a:r>
+              <a:rPr lang="en-US" dirty="0" smtClean="0"/>
+              <a:t>scope</a:t>
+            </a:r>
+          </a:p>
+          <a:p>
+            <a:pPr lvl="1"/>
+            <a:r>
+              <a:rPr lang="en-US" dirty="0" smtClean="0"/>
+              <a:t>Newer versions of </a:t>
+            </a:r>
+            <a:r>
+              <a:rPr lang="en-US" dirty="0" err="1" smtClean="0"/>
+              <a:t>StructureMap</a:t>
+            </a:r>
+            <a:r>
+              <a:rPr lang="en-US" dirty="0"/>
+              <a:t> </a:t>
+            </a:r>
+            <a:r>
+              <a:rPr lang="en-US" dirty="0" smtClean="0"/>
+              <a:t>have nested containers and transient scope</a:t>
+            </a:r>
+            <a:endParaRPr lang="en-US" dirty="0" smtClean="0"/>
           </a:p>
           <a:p>
             <a:r>

</xml_diff>

<commit_message>
Added info about Unity.
</commit_message>
<xml_diff>
--- a/Entity Framework Extra Mile/IADNUG 20150306/EF Extra Mile.pptx
+++ b/Entity Framework Extra Mile/IADNUG 20150306/EF Extra Mile.pptx
@@ -3240,21 +3240,13 @@
             <a:pPr lvl="2"/>
             <a:r>
               <a:rPr lang="en-US" dirty="0" smtClean="0"/>
-              <a:t>Requires EF </a:t>
-            </a:r>
-            <a:r>
-              <a:rPr lang="en-US" dirty="0" smtClean="0"/>
-              <a:t>6.1.1+.</a:t>
-            </a:r>
-          </a:p>
-          <a:p>
-            <a:r>
-              <a:rPr lang="en-US" dirty="0" smtClean="0"/>
-              <a:t>Handle </a:t>
-            </a:r>
-            <a:r>
-              <a:rPr lang="en-US" dirty="0" smtClean="0"/>
-              <a:t>others in </a:t>
+              <a:t>Requires EF 6.1.1+.</a:t>
+            </a:r>
+          </a:p>
+          <a:p>
+            <a:r>
+              <a:rPr lang="en-US" dirty="0" smtClean="0"/>
+              <a:t>Handle others in </a:t>
             </a:r>
             <a:r>
               <a:rPr lang="en-US" dirty="0" err="1" smtClean="0"/>
@@ -6318,6 +6310,22 @@
             </a:r>
             <a:r>
               <a:rPr lang="en-US" dirty="0" smtClean="0"/>
+              <a:t>scope, newer </a:t>
+            </a:r>
+            <a:r>
+              <a:rPr lang="en-US" dirty="0" smtClean="0"/>
+              <a:t>versions </a:t>
+            </a:r>
+            <a:r>
+              <a:rPr lang="en-US" dirty="0" smtClean="0"/>
+              <a:t>have </a:t>
+            </a:r>
+            <a:r>
+              <a:rPr lang="en-US" dirty="0" smtClean="0"/>
+              <a:t>nested containers and transient </a:t>
+            </a:r>
+            <a:r>
+              <a:rPr lang="en-US" dirty="0" smtClean="0"/>
               <a:t>scope</a:t>
             </a:r>
           </a:p>
@@ -6325,19 +6333,11 @@
             <a:pPr lvl="1"/>
             <a:r>
               <a:rPr lang="en-US" dirty="0" smtClean="0"/>
-              <a:t>Newer versions of </a:t>
+              <a:t>Unity has </a:t>
             </a:r>
             <a:r>
               <a:rPr lang="en-US" dirty="0" err="1" smtClean="0"/>
-              <a:t>StructureMap</a:t>
-            </a:r>
-            <a:r>
-              <a:rPr lang="en-US" dirty="0"/>
-              <a:t> </a:t>
-            </a:r>
-            <a:r>
-              <a:rPr lang="en-US" dirty="0" smtClean="0"/>
-              <a:t>have nested containers and transient scope</a:t>
+              <a:t>PerRequestLifetimeManager</a:t>
             </a:r>
             <a:endParaRPr lang="en-US" dirty="0" smtClean="0"/>
           </a:p>

</xml_diff>

<commit_message>
Added info about async.
</commit_message>
<xml_diff>
--- a/Entity Framework Extra Mile/IADNUG 20150306/EF Extra Mile.pptx
+++ b/Entity Framework Extra Mile/IADNUG 20150306/EF Extra Mile.pptx
@@ -17,8 +17,9 @@
     <p:sldId id="265" r:id="rId11"/>
     <p:sldId id="267" r:id="rId12"/>
     <p:sldId id="266" r:id="rId13"/>
-    <p:sldId id="268" r:id="rId14"/>
-    <p:sldId id="269" r:id="rId15"/>
+    <p:sldId id="270" r:id="rId14"/>
+    <p:sldId id="268" r:id="rId15"/>
+    <p:sldId id="269" r:id="rId16"/>
   </p:sldIdLst>
   <p:sldSz cx="12192000" cy="6858000"/>
   <p:notesSz cx="6858000" cy="9144000"/>
@@ -134,6 +135,7 @@
             <p14:sldId id="265"/>
             <p14:sldId id="267"/>
             <p14:sldId id="266"/>
+            <p14:sldId id="270"/>
             <p14:sldId id="268"/>
             <p14:sldId id="269"/>
           </p14:sldIdLst>
@@ -278,7 +280,7 @@
           <a:p>
             <a:fld id="{856365B8-A905-4126-A305-28D558C34FD5}" type="datetimeFigureOut">
               <a:rPr lang="en-US" smtClean="0"/>
-              <a:t>3/3/2015</a:t>
+              <a:t>3/4/2015</a:t>
             </a:fld>
             <a:endParaRPr lang="en-US"/>
           </a:p>
@@ -448,7 +450,7 @@
           <a:p>
             <a:fld id="{856365B8-A905-4126-A305-28D558C34FD5}" type="datetimeFigureOut">
               <a:rPr lang="en-US" smtClean="0"/>
-              <a:t>3/3/2015</a:t>
+              <a:t>3/4/2015</a:t>
             </a:fld>
             <a:endParaRPr lang="en-US"/>
           </a:p>
@@ -628,7 +630,7 @@
           <a:p>
             <a:fld id="{856365B8-A905-4126-A305-28D558C34FD5}" type="datetimeFigureOut">
               <a:rPr lang="en-US" smtClean="0"/>
-              <a:t>3/3/2015</a:t>
+              <a:t>3/4/2015</a:t>
             </a:fld>
             <a:endParaRPr lang="en-US"/>
           </a:p>
@@ -798,7 +800,7 @@
           <a:p>
             <a:fld id="{856365B8-A905-4126-A305-28D558C34FD5}" type="datetimeFigureOut">
               <a:rPr lang="en-US" smtClean="0"/>
-              <a:t>3/3/2015</a:t>
+              <a:t>3/4/2015</a:t>
             </a:fld>
             <a:endParaRPr lang="en-US"/>
           </a:p>
@@ -1044,7 +1046,7 @@
           <a:p>
             <a:fld id="{856365B8-A905-4126-A305-28D558C34FD5}" type="datetimeFigureOut">
               <a:rPr lang="en-US" smtClean="0"/>
-              <a:t>3/3/2015</a:t>
+              <a:t>3/4/2015</a:t>
             </a:fld>
             <a:endParaRPr lang="en-US"/>
           </a:p>
@@ -1276,7 +1278,7 @@
           <a:p>
             <a:fld id="{856365B8-A905-4126-A305-28D558C34FD5}" type="datetimeFigureOut">
               <a:rPr lang="en-US" smtClean="0"/>
-              <a:t>3/3/2015</a:t>
+              <a:t>3/4/2015</a:t>
             </a:fld>
             <a:endParaRPr lang="en-US"/>
           </a:p>
@@ -1643,7 +1645,7 @@
           <a:p>
             <a:fld id="{856365B8-A905-4126-A305-28D558C34FD5}" type="datetimeFigureOut">
               <a:rPr lang="en-US" smtClean="0"/>
-              <a:t>3/3/2015</a:t>
+              <a:t>3/4/2015</a:t>
             </a:fld>
             <a:endParaRPr lang="en-US"/>
           </a:p>
@@ -1761,7 +1763,7 @@
           <a:p>
             <a:fld id="{856365B8-A905-4126-A305-28D558C34FD5}" type="datetimeFigureOut">
               <a:rPr lang="en-US" smtClean="0"/>
-              <a:t>3/3/2015</a:t>
+              <a:t>3/4/2015</a:t>
             </a:fld>
             <a:endParaRPr lang="en-US"/>
           </a:p>
@@ -1856,7 +1858,7 @@
           <a:p>
             <a:fld id="{856365B8-A905-4126-A305-28D558C34FD5}" type="datetimeFigureOut">
               <a:rPr lang="en-US" smtClean="0"/>
-              <a:t>3/3/2015</a:t>
+              <a:t>3/4/2015</a:t>
             </a:fld>
             <a:endParaRPr lang="en-US"/>
           </a:p>
@@ -2133,7 +2135,7 @@
           <a:p>
             <a:fld id="{856365B8-A905-4126-A305-28D558C34FD5}" type="datetimeFigureOut">
               <a:rPr lang="en-US" smtClean="0"/>
-              <a:t>3/3/2015</a:t>
+              <a:t>3/4/2015</a:t>
             </a:fld>
             <a:endParaRPr lang="en-US"/>
           </a:p>
@@ -2390,7 +2392,7 @@
           <a:p>
             <a:fld id="{856365B8-A905-4126-A305-28D558C34FD5}" type="datetimeFigureOut">
               <a:rPr lang="en-US" smtClean="0"/>
-              <a:t>3/3/2015</a:t>
+              <a:t>3/4/2015</a:t>
             </a:fld>
             <a:endParaRPr lang="en-US"/>
           </a:p>
@@ -2603,7 +2605,7 @@
           <a:p>
             <a:fld id="{856365B8-A905-4126-A305-28D558C34FD5}" type="datetimeFigureOut">
               <a:rPr lang="en-US" smtClean="0"/>
-              <a:t>3/3/2015</a:t>
+              <a:t>3/4/2015</a:t>
             </a:fld>
             <a:endParaRPr lang="en-US"/>
           </a:p>
@@ -3513,6 +3515,165 @@
           <a:p>
             <a:r>
               <a:rPr lang="en-US" dirty="0" smtClean="0"/>
+              <a:t>Asynchronous Pattern Support</a:t>
+            </a:r>
+            <a:endParaRPr lang="en-US" dirty="0"/>
+          </a:p>
+        </p:txBody>
+      </p:sp>
+      <p:sp>
+        <p:nvSpPr>
+          <p:cNvPr id="3" name="Content Placeholder 2"/>
+          <p:cNvSpPr>
+            <a:spLocks noGrp="1"/>
+          </p:cNvSpPr>
+          <p:nvPr>
+            <p:ph idx="1"/>
+          </p:nvPr>
+        </p:nvSpPr>
+        <p:spPr/>
+        <p:txBody>
+          <a:bodyPr/>
+          <a:lstStyle/>
+          <a:p>
+            <a:r>
+              <a:rPr lang="en-US" dirty="0" smtClean="0"/>
+              <a:t>EF supports task-based </a:t>
+            </a:r>
+            <a:r>
+              <a:rPr lang="en-US" dirty="0" err="1" smtClean="0"/>
+              <a:t>async</a:t>
+            </a:r>
+            <a:r>
+              <a:rPr lang="en-US" dirty="0" smtClean="0"/>
+              <a:t> pattern introduced in .NET 4.5.</a:t>
+            </a:r>
+          </a:p>
+          <a:p>
+            <a:r>
+              <a:rPr lang="en-US" dirty="0" smtClean="0"/>
+              <a:t>The following common methods are supported:</a:t>
+            </a:r>
+          </a:p>
+          <a:p>
+            <a:pPr lvl="1"/>
+            <a:r>
+              <a:rPr lang="en-US" dirty="0" err="1" smtClean="0"/>
+              <a:t>ToListAsync</a:t>
+            </a:r>
+            <a:r>
+              <a:rPr lang="en-US" dirty="0" smtClean="0"/>
+              <a:t>()</a:t>
+            </a:r>
+          </a:p>
+          <a:p>
+            <a:pPr lvl="1"/>
+            <a:r>
+              <a:rPr lang="en-US" dirty="0" err="1" smtClean="0"/>
+              <a:t>SingleOrDefaultAsync</a:t>
+            </a:r>
+            <a:r>
+              <a:rPr lang="en-US" dirty="0" smtClean="0"/>
+              <a:t>()</a:t>
+            </a:r>
+          </a:p>
+          <a:p>
+            <a:pPr lvl="1"/>
+            <a:r>
+              <a:rPr lang="en-US" dirty="0" err="1" smtClean="0"/>
+              <a:t>CountAsync</a:t>
+            </a:r>
+            <a:r>
+              <a:rPr lang="en-US" dirty="0" smtClean="0"/>
+              <a:t>()</a:t>
+            </a:r>
+          </a:p>
+          <a:p>
+            <a:pPr lvl="1"/>
+            <a:r>
+              <a:rPr lang="en-US" dirty="0" err="1" smtClean="0"/>
+              <a:t>SaveChangesAsync</a:t>
+            </a:r>
+            <a:r>
+              <a:rPr lang="en-US" dirty="0" smtClean="0"/>
+              <a:t>()</a:t>
+            </a:r>
+            <a:endParaRPr lang="en-US" dirty="0"/>
+          </a:p>
+          <a:p>
+            <a:r>
+              <a:rPr lang="en-US" dirty="0" smtClean="0"/>
+              <a:t>Raw queries also supported:</a:t>
+            </a:r>
+          </a:p>
+          <a:p>
+            <a:pPr lvl="1"/>
+            <a:r>
+              <a:rPr lang="en-US" dirty="0" err="1" smtClean="0"/>
+              <a:t>context.Database.SqlQuery</a:t>
+            </a:r>
+            <a:r>
+              <a:rPr lang="en-US" dirty="0" smtClean="0"/>
+              <a:t>&lt;Movie&gt;(“select * from movie”).</a:t>
+            </a:r>
+            <a:r>
+              <a:rPr lang="en-US" dirty="0" err="1" smtClean="0"/>
+              <a:t>ToListAsync</a:t>
+            </a:r>
+            <a:r>
+              <a:rPr lang="en-US" dirty="0" smtClean="0"/>
+              <a:t>()</a:t>
+            </a:r>
+          </a:p>
+        </p:txBody>
+      </p:sp>
+    </p:spTree>
+    <p:extLst>
+      <p:ext uri="{BB962C8B-B14F-4D97-AF65-F5344CB8AC3E}">
+        <p14:creationId xmlns:p14="http://schemas.microsoft.com/office/powerpoint/2010/main" val="1070994223"/>
+      </p:ext>
+    </p:extLst>
+  </p:cSld>
+  <p:clrMapOvr>
+    <a:masterClrMapping/>
+  </p:clrMapOvr>
+</p:sld>
+</file>
+
+<file path=ppt/slides/slide14.xml><?xml version="1.0" encoding="utf-8"?>
+<p:sld xmlns:a="http://schemas.openxmlformats.org/drawingml/2006/main" xmlns:r="http://schemas.openxmlformats.org/officeDocument/2006/relationships" xmlns:p="http://schemas.openxmlformats.org/presentationml/2006/main">
+  <p:cSld>
+    <p:spTree>
+      <p:nvGrpSpPr>
+        <p:cNvPr id="1" name=""/>
+        <p:cNvGrpSpPr/>
+        <p:nvPr/>
+      </p:nvGrpSpPr>
+      <p:grpSpPr>
+        <a:xfrm>
+          <a:off x="0" y="0"/>
+          <a:ext cx="0" cy="0"/>
+          <a:chOff x="0" y="0"/>
+          <a:chExt cx="0" cy="0"/>
+        </a:xfrm>
+      </p:grpSpPr>
+      <p:sp>
+        <p:nvSpPr>
+          <p:cNvPr id="2" name="Title 1"/>
+          <p:cNvSpPr>
+            <a:spLocks noGrp="1"/>
+          </p:cNvSpPr>
+          <p:nvPr>
+            <p:ph type="title"/>
+          </p:nvPr>
+        </p:nvSpPr>
+        <p:spPr/>
+        <p:txBody>
+          <a:bodyPr/>
+          <a:lstStyle/>
+          <a:p>
+            <a:r>
+              <a:rPr lang="en-US" dirty="0" smtClean="0"/>
               <a:t>Entity Framework Migrations</a:t>
             </a:r>
             <a:endParaRPr lang="en-US" dirty="0"/>
@@ -3630,7 +3791,7 @@
 </p:sld>
 </file>
 
-<file path=ppt/slides/slide14.xml><?xml version="1.0" encoding="utf-8"?>
+<file path=ppt/slides/slide15.xml><?xml version="1.0" encoding="utf-8"?>
 <p:sld xmlns:a="http://schemas.openxmlformats.org/drawingml/2006/main" xmlns:r="http://schemas.openxmlformats.org/officeDocument/2006/relationships" xmlns:p="http://schemas.openxmlformats.org/presentationml/2006/main">
   <p:cSld>
     <p:spTree>
@@ -6306,27 +6467,7 @@
             </a:r>
             <a:r>
               <a:rPr lang="en-US" dirty="0" smtClean="0"/>
-              <a:t> </a:t>
-            </a:r>
-            <a:r>
-              <a:rPr lang="en-US" dirty="0" smtClean="0"/>
-              <a:t>scope, newer </a:t>
-            </a:r>
-            <a:r>
-              <a:rPr lang="en-US" dirty="0" smtClean="0"/>
-              <a:t>versions </a:t>
-            </a:r>
-            <a:r>
-              <a:rPr lang="en-US" dirty="0" smtClean="0"/>
-              <a:t>have </a:t>
-            </a:r>
-            <a:r>
-              <a:rPr lang="en-US" dirty="0" smtClean="0"/>
-              <a:t>nested containers and transient </a:t>
-            </a:r>
-            <a:r>
-              <a:rPr lang="en-US" dirty="0" smtClean="0"/>
-              <a:t>scope</a:t>
+              <a:t> scope, newer versions have nested containers and transient scope</a:t>
             </a:r>
           </a:p>
           <a:p>

</xml_diff>

<commit_message>
Added info about v7 uncertainty.
</commit_message>
<xml_diff>
--- a/Entity Framework Extra Mile/IADNUG 20150306/EF Extra Mile.pptx
+++ b/Entity Framework Extra Mile/IADNUG 20150306/EF Extra Mile.pptx
@@ -10,16 +10,17 @@
     <p:sldId id="258" r:id="rId4"/>
     <p:sldId id="259" r:id="rId5"/>
     <p:sldId id="260" r:id="rId6"/>
-    <p:sldId id="262" r:id="rId7"/>
-    <p:sldId id="263" r:id="rId8"/>
-    <p:sldId id="261" r:id="rId9"/>
-    <p:sldId id="264" r:id="rId10"/>
-    <p:sldId id="265" r:id="rId11"/>
-    <p:sldId id="267" r:id="rId12"/>
-    <p:sldId id="266" r:id="rId13"/>
-    <p:sldId id="270" r:id="rId14"/>
-    <p:sldId id="268" r:id="rId15"/>
-    <p:sldId id="269" r:id="rId16"/>
+    <p:sldId id="271" r:id="rId7"/>
+    <p:sldId id="262" r:id="rId8"/>
+    <p:sldId id="263" r:id="rId9"/>
+    <p:sldId id="261" r:id="rId10"/>
+    <p:sldId id="264" r:id="rId11"/>
+    <p:sldId id="265" r:id="rId12"/>
+    <p:sldId id="267" r:id="rId13"/>
+    <p:sldId id="266" r:id="rId14"/>
+    <p:sldId id="270" r:id="rId15"/>
+    <p:sldId id="268" r:id="rId16"/>
+    <p:sldId id="269" r:id="rId17"/>
   </p:sldIdLst>
   <p:sldSz cx="12192000" cy="6858000"/>
   <p:notesSz cx="6858000" cy="9144000"/>
@@ -128,6 +129,7 @@
             <p14:sldId id="258"/>
             <p14:sldId id="259"/>
             <p14:sldId id="260"/>
+            <p14:sldId id="271"/>
             <p14:sldId id="262"/>
             <p14:sldId id="263"/>
             <p14:sldId id="261"/>
@@ -280,7 +282,7 @@
           <a:p>
             <a:fld id="{856365B8-A905-4126-A305-28D558C34FD5}" type="datetimeFigureOut">
               <a:rPr lang="en-US" smtClean="0"/>
-              <a:t>3/4/2015</a:t>
+              <a:t>3/5/2015</a:t>
             </a:fld>
             <a:endParaRPr lang="en-US"/>
           </a:p>
@@ -450,7 +452,7 @@
           <a:p>
             <a:fld id="{856365B8-A905-4126-A305-28D558C34FD5}" type="datetimeFigureOut">
               <a:rPr lang="en-US" smtClean="0"/>
-              <a:t>3/4/2015</a:t>
+              <a:t>3/5/2015</a:t>
             </a:fld>
             <a:endParaRPr lang="en-US"/>
           </a:p>
@@ -630,7 +632,7 @@
           <a:p>
             <a:fld id="{856365B8-A905-4126-A305-28D558C34FD5}" type="datetimeFigureOut">
               <a:rPr lang="en-US" smtClean="0"/>
-              <a:t>3/4/2015</a:t>
+              <a:t>3/5/2015</a:t>
             </a:fld>
             <a:endParaRPr lang="en-US"/>
           </a:p>
@@ -800,7 +802,7 @@
           <a:p>
             <a:fld id="{856365B8-A905-4126-A305-28D558C34FD5}" type="datetimeFigureOut">
               <a:rPr lang="en-US" smtClean="0"/>
-              <a:t>3/4/2015</a:t>
+              <a:t>3/5/2015</a:t>
             </a:fld>
             <a:endParaRPr lang="en-US"/>
           </a:p>
@@ -1046,7 +1048,7 @@
           <a:p>
             <a:fld id="{856365B8-A905-4126-A305-28D558C34FD5}" type="datetimeFigureOut">
               <a:rPr lang="en-US" smtClean="0"/>
-              <a:t>3/4/2015</a:t>
+              <a:t>3/5/2015</a:t>
             </a:fld>
             <a:endParaRPr lang="en-US"/>
           </a:p>
@@ -1278,7 +1280,7 @@
           <a:p>
             <a:fld id="{856365B8-A905-4126-A305-28D558C34FD5}" type="datetimeFigureOut">
               <a:rPr lang="en-US" smtClean="0"/>
-              <a:t>3/4/2015</a:t>
+              <a:t>3/5/2015</a:t>
             </a:fld>
             <a:endParaRPr lang="en-US"/>
           </a:p>
@@ -1645,7 +1647,7 @@
           <a:p>
             <a:fld id="{856365B8-A905-4126-A305-28D558C34FD5}" type="datetimeFigureOut">
               <a:rPr lang="en-US" smtClean="0"/>
-              <a:t>3/4/2015</a:t>
+              <a:t>3/5/2015</a:t>
             </a:fld>
             <a:endParaRPr lang="en-US"/>
           </a:p>
@@ -1763,7 +1765,7 @@
           <a:p>
             <a:fld id="{856365B8-A905-4126-A305-28D558C34FD5}" type="datetimeFigureOut">
               <a:rPr lang="en-US" smtClean="0"/>
-              <a:t>3/4/2015</a:t>
+              <a:t>3/5/2015</a:t>
             </a:fld>
             <a:endParaRPr lang="en-US"/>
           </a:p>
@@ -1858,7 +1860,7 @@
           <a:p>
             <a:fld id="{856365B8-A905-4126-A305-28D558C34FD5}" type="datetimeFigureOut">
               <a:rPr lang="en-US" smtClean="0"/>
-              <a:t>3/4/2015</a:t>
+              <a:t>3/5/2015</a:t>
             </a:fld>
             <a:endParaRPr lang="en-US"/>
           </a:p>
@@ -2135,7 +2137,7 @@
           <a:p>
             <a:fld id="{856365B8-A905-4126-A305-28D558C34FD5}" type="datetimeFigureOut">
               <a:rPr lang="en-US" smtClean="0"/>
-              <a:t>3/4/2015</a:t>
+              <a:t>3/5/2015</a:t>
             </a:fld>
             <a:endParaRPr lang="en-US"/>
           </a:p>
@@ -2392,7 +2394,7 @@
           <a:p>
             <a:fld id="{856365B8-A905-4126-A305-28D558C34FD5}" type="datetimeFigureOut">
               <a:rPr lang="en-US" smtClean="0"/>
-              <a:t>3/4/2015</a:t>
+              <a:t>3/5/2015</a:t>
             </a:fld>
             <a:endParaRPr lang="en-US"/>
           </a:p>
@@ -2605,7 +2607,7 @@
           <a:p>
             <a:fld id="{856365B8-A905-4126-A305-28D558C34FD5}" type="datetimeFigureOut">
               <a:rPr lang="en-US" smtClean="0"/>
-              <a:t>3/4/2015</a:t>
+              <a:t>3/5/2015</a:t>
             </a:fld>
             <a:endParaRPr lang="en-US"/>
           </a:p>
@@ -3121,63 +3123,22 @@
         </p:nvSpPr>
         <p:spPr/>
         <p:txBody>
-          <a:bodyPr>
-            <a:normAutofit/>
-          </a:bodyPr>
-          <a:lstStyle/>
-          <a:p>
-            <a:r>
-              <a:rPr lang="en-US" dirty="0" smtClean="0"/>
-              <a:t>Handling the Fab Five</a:t>
-            </a:r>
-            <a:br>
-              <a:rPr lang="en-US" dirty="0" smtClean="0"/>
-            </a:br>
-            <a:r>
-              <a:rPr lang="en-US" sz="3100" dirty="0" smtClean="0"/>
-              <a:t>(</a:t>
-            </a:r>
-            <a:r>
-              <a:rPr lang="en-US" sz="3100" dirty="0" err="1" smtClean="0"/>
-              <a:t>IsDeleted</a:t>
-            </a:r>
-            <a:r>
-              <a:rPr lang="en-US" sz="3100" dirty="0" smtClean="0"/>
-              <a:t>, </a:t>
-            </a:r>
-            <a:r>
-              <a:rPr lang="en-US" sz="3100" dirty="0" err="1" smtClean="0"/>
-              <a:t>UpdatedDate</a:t>
-            </a:r>
-            <a:r>
-              <a:rPr lang="en-US" sz="3100" dirty="0" smtClean="0"/>
-              <a:t>, </a:t>
-            </a:r>
-            <a:r>
-              <a:rPr lang="en-US" sz="3100" dirty="0" err="1" smtClean="0"/>
-              <a:t>UpdatedBy</a:t>
-            </a:r>
-            <a:r>
-              <a:rPr lang="en-US" sz="3100" dirty="0" smtClean="0"/>
-              <a:t>, </a:t>
-            </a:r>
-            <a:r>
-              <a:rPr lang="en-US" sz="3100" dirty="0" err="1" smtClean="0"/>
-              <a:t>CreatedDate</a:t>
-            </a:r>
-            <a:r>
-              <a:rPr lang="en-US" sz="3100" dirty="0" smtClean="0"/>
-              <a:t>, </a:t>
-            </a:r>
-            <a:r>
-              <a:rPr lang="en-US" sz="3100" dirty="0" err="1" smtClean="0"/>
-              <a:t>CreatedBy</a:t>
-            </a:r>
-            <a:r>
-              <a:rPr lang="en-US" sz="3100" dirty="0" smtClean="0"/>
-              <a:t>)</a:t>
-            </a:r>
-            <a:endParaRPr lang="en-US" sz="3100" dirty="0"/>
+          <a:bodyPr/>
+          <a:lstStyle/>
+          <a:p>
+            <a:r>
+              <a:rPr lang="en-US" dirty="0" smtClean="0"/>
+              <a:t>Use </a:t>
+            </a:r>
+            <a:r>
+              <a:rPr lang="en-US" dirty="0" err="1" smtClean="0"/>
+              <a:t>AutoMapper</a:t>
+            </a:r>
+            <a:r>
+              <a:rPr lang="en-US" dirty="0" smtClean="0"/>
+              <a:t> Projections</a:t>
+            </a:r>
+            <a:endParaRPr lang="en-US" dirty="0"/>
           </a:p>
         </p:txBody>
       </p:sp>
@@ -3198,88 +3159,51 @@
           <a:p>
             <a:r>
               <a:rPr lang="en-US" dirty="0" smtClean="0"/>
-              <a:t>Place fields in Entity base class</a:t>
-            </a:r>
-          </a:p>
-          <a:p>
-            <a:r>
-              <a:rPr lang="en-US" dirty="0" smtClean="0"/>
-              <a:t>Handle </a:t>
-            </a:r>
-            <a:r>
-              <a:rPr lang="en-US" dirty="0" err="1" smtClean="0"/>
-              <a:t>IsDeleted</a:t>
-            </a:r>
-            <a:r>
-              <a:rPr lang="en-US" dirty="0" smtClean="0"/>
-              <a:t> by using Soft Delete functionality</a:t>
+              <a:t>Alternative to explicitly using Include statements</a:t>
             </a:r>
           </a:p>
           <a:p>
             <a:pPr lvl="1"/>
             <a:r>
               <a:rPr lang="en-US" dirty="0" smtClean="0"/>
-              <a:t>Using patterns demoed by Rowan Miller at TechEd 2014</a:t>
-            </a:r>
-          </a:p>
-          <a:p>
-            <a:pPr lvl="2"/>
-            <a:r>
-              <a:rPr lang="en-US" dirty="0">
-                <a:hlinkClick r:id="rId2"/>
-              </a:rPr>
-              <a:t>https://</a:t>
-            </a:r>
-            <a:r>
-              <a:rPr lang="en-US" dirty="0" smtClean="0">
-                <a:hlinkClick r:id="rId2"/>
-              </a:rPr>
-              <a:t>github.com/rowanmiller/Demo-TechEd2014</a:t>
-            </a:r>
-            <a:endParaRPr lang="en-US" dirty="0" smtClean="0"/>
-          </a:p>
-          <a:p>
-            <a:pPr lvl="2"/>
-            <a:r>
-              <a:rPr lang="en-US" dirty="0" smtClean="0"/>
-              <a:t>Requires EF 6.1.1+.</a:t>
-            </a:r>
-          </a:p>
-          <a:p>
-            <a:r>
-              <a:rPr lang="en-US" dirty="0" smtClean="0"/>
-              <a:t>Handle others in </a:t>
-            </a:r>
-            <a:r>
-              <a:rPr lang="en-US" dirty="0" err="1" smtClean="0"/>
-              <a:t>DataContext</a:t>
-            </a:r>
-            <a:r>
-              <a:rPr lang="en-US" dirty="0" smtClean="0"/>
-              <a:t> </a:t>
-            </a:r>
-            <a:r>
-              <a:rPr lang="en-US" dirty="0" err="1" smtClean="0"/>
-              <a:t>SaveChanges</a:t>
-            </a:r>
-            <a:r>
-              <a:rPr lang="en-US" dirty="0" smtClean="0"/>
-              <a:t> override</a:t>
-            </a:r>
-            <a:endParaRPr lang="en-US" dirty="0"/>
+              <a:t>Ensures you don’t use additional data elements and forget to modify Includes</a:t>
+            </a:r>
+          </a:p>
+          <a:p>
+            <a:r>
+              <a:rPr lang="en-US" dirty="0" smtClean="0"/>
+              <a:t>Side effect: Generate SQL only selects fields needed, instead of SELECT *</a:t>
+            </a:r>
+          </a:p>
+          <a:p>
+            <a:r>
+              <a:rPr lang="en-US" dirty="0" smtClean="0"/>
+              <a:t>More </a:t>
+            </a:r>
+            <a:r>
+              <a:rPr lang="en-US" dirty="0"/>
+              <a:t>Info: http://lostechies.com/jimmybogard/2014/04/03/using-automapper-to-prevent-select-n1-problems/</a:t>
+            </a:r>
           </a:p>
         </p:txBody>
       </p:sp>
     </p:spTree>
     <p:extLst>
       <p:ext uri="{BB962C8B-B14F-4D97-AF65-F5344CB8AC3E}">
-        <p14:creationId xmlns:p14="http://schemas.microsoft.com/office/powerpoint/2010/main" val="2327823055"/>
+        <p14:creationId xmlns:p14="http://schemas.microsoft.com/office/powerpoint/2010/main" val="2386748387"/>
       </p:ext>
     </p:extLst>
   </p:cSld>
   <p:clrMapOvr>
     <a:masterClrMapping/>
   </p:clrMapOvr>
+  <p:timing>
+    <p:tnLst>
+      <p:par>
+        <p:cTn id="1" dur="indefinite" restart="never" nodeType="tmRoot"/>
+      </p:par>
+    </p:tnLst>
+  </p:timing>
 </p:sld>
 </file>
 
@@ -3312,67 +3236,150 @@
         </p:nvSpPr>
         <p:spPr/>
         <p:txBody>
-          <a:bodyPr/>
-          <a:lstStyle/>
-          <a:p>
+          <a:bodyPr>
+            <a:normAutofit/>
+          </a:bodyPr>
+          <a:lstStyle/>
+          <a:p>
+            <a:r>
+              <a:rPr lang="en-US" dirty="0" smtClean="0"/>
+              <a:t>Handling the Fab Five</a:t>
+            </a:r>
+            <a:br>
+              <a:rPr lang="en-US" dirty="0" smtClean="0"/>
+            </a:br>
+            <a:r>
+              <a:rPr lang="en-US" sz="3100" dirty="0" smtClean="0"/>
+              <a:t>(</a:t>
+            </a:r>
+            <a:r>
+              <a:rPr lang="en-US" sz="3100" dirty="0" err="1" smtClean="0"/>
+              <a:t>IsDeleted</a:t>
+            </a:r>
+            <a:r>
+              <a:rPr lang="en-US" sz="3100" dirty="0" smtClean="0"/>
+              <a:t>, </a:t>
+            </a:r>
+            <a:r>
+              <a:rPr lang="en-US" sz="3100" dirty="0" err="1" smtClean="0"/>
+              <a:t>UpdatedDate</a:t>
+            </a:r>
+            <a:r>
+              <a:rPr lang="en-US" sz="3100" dirty="0" smtClean="0"/>
+              <a:t>, </a:t>
+            </a:r>
+            <a:r>
+              <a:rPr lang="en-US" sz="3100" dirty="0" err="1" smtClean="0"/>
+              <a:t>UpdatedBy</a:t>
+            </a:r>
+            <a:r>
+              <a:rPr lang="en-US" sz="3100" dirty="0" smtClean="0"/>
+              <a:t>, </a:t>
+            </a:r>
+            <a:r>
+              <a:rPr lang="en-US" sz="3100" dirty="0" err="1" smtClean="0"/>
+              <a:t>CreatedDate</a:t>
+            </a:r>
+            <a:r>
+              <a:rPr lang="en-US" sz="3100" dirty="0" smtClean="0"/>
+              <a:t>, </a:t>
+            </a:r>
+            <a:r>
+              <a:rPr lang="en-US" sz="3100" dirty="0" err="1" smtClean="0"/>
+              <a:t>CreatedBy</a:t>
+            </a:r>
+            <a:r>
+              <a:rPr lang="en-US" sz="3100" dirty="0" smtClean="0"/>
+              <a:t>)</a:t>
+            </a:r>
+            <a:endParaRPr lang="en-US" sz="3100" dirty="0"/>
+          </a:p>
+        </p:txBody>
+      </p:sp>
+      <p:sp>
+        <p:nvSpPr>
+          <p:cNvPr id="3" name="Content Placeholder 2"/>
+          <p:cNvSpPr>
+            <a:spLocks noGrp="1"/>
+          </p:cNvSpPr>
+          <p:nvPr>
+            <p:ph idx="1"/>
+          </p:nvPr>
+        </p:nvSpPr>
+        <p:spPr/>
+        <p:txBody>
+          <a:bodyPr/>
+          <a:lstStyle/>
+          <a:p>
+            <a:r>
+              <a:rPr lang="en-US" dirty="0" smtClean="0"/>
+              <a:t>Place fields in Entity base class</a:t>
+            </a:r>
+          </a:p>
+          <a:p>
+            <a:r>
+              <a:rPr lang="en-US" dirty="0" smtClean="0"/>
+              <a:t>Handle </a:t>
+            </a:r>
             <a:r>
               <a:rPr lang="en-US" dirty="0" err="1" smtClean="0"/>
-              <a:t>EntityFramework.Extended</a:t>
-            </a:r>
-            <a:endParaRPr lang="en-US" dirty="0"/>
-          </a:p>
-        </p:txBody>
-      </p:sp>
-      <p:sp>
-        <p:nvSpPr>
-          <p:cNvPr id="3" name="Content Placeholder 2"/>
-          <p:cNvSpPr>
-            <a:spLocks noGrp="1"/>
-          </p:cNvSpPr>
-          <p:nvPr>
-            <p:ph idx="1"/>
-          </p:nvPr>
-        </p:nvSpPr>
-        <p:spPr/>
-        <p:txBody>
-          <a:bodyPr/>
-          <a:lstStyle/>
-          <a:p>
-            <a:r>
-              <a:rPr lang="en-US" dirty="0"/>
-              <a:t>https://github.com/loresoft/EntityFramework.Extended</a:t>
-            </a:r>
-          </a:p>
-          <a:p>
-            <a:r>
-              <a:rPr lang="en-US" dirty="0" smtClean="0"/>
-              <a:t>Batch Delete and Updates</a:t>
+              <a:t>IsDeleted</a:t>
+            </a:r>
+            <a:r>
+              <a:rPr lang="en-US" dirty="0" smtClean="0"/>
+              <a:t> by using Soft Delete functionality</a:t>
             </a:r>
           </a:p>
           <a:p>
             <a:pPr lvl="1"/>
             <a:r>
               <a:rPr lang="en-US" dirty="0" smtClean="0"/>
-              <a:t>Bypasses Interceptors, so beware if using Soft Deletes</a:t>
-            </a:r>
-          </a:p>
-          <a:p>
-            <a:r>
-              <a:rPr lang="en-US" dirty="0" smtClean="0"/>
-              <a:t>Future Queries</a:t>
-            </a:r>
-          </a:p>
-          <a:p>
-            <a:pPr lvl="1"/>
-            <a:r>
-              <a:rPr lang="en-US" dirty="0" smtClean="0"/>
-              <a:t>Batches multiple statements into one round trip</a:t>
-            </a:r>
-          </a:p>
-          <a:p>
-            <a:r>
-              <a:rPr lang="en-US" dirty="0" smtClean="0"/>
-              <a:t>Audit Log</a:t>
+              <a:t>Using patterns demoed by Rowan Miller at TechEd 2014</a:t>
+            </a:r>
+          </a:p>
+          <a:p>
+            <a:pPr lvl="2"/>
+            <a:r>
+              <a:rPr lang="en-US" dirty="0">
+                <a:hlinkClick r:id="rId2"/>
+              </a:rPr>
+              <a:t>https://</a:t>
+            </a:r>
+            <a:r>
+              <a:rPr lang="en-US" dirty="0" smtClean="0">
+                <a:hlinkClick r:id="rId2"/>
+              </a:rPr>
+              <a:t>github.com/rowanmiller/Demo-TechEd2014</a:t>
+            </a:r>
+            <a:endParaRPr lang="en-US" dirty="0" smtClean="0"/>
+          </a:p>
+          <a:p>
+            <a:pPr lvl="2"/>
+            <a:r>
+              <a:rPr lang="en-US" dirty="0" smtClean="0"/>
+              <a:t>Requires EF 6.1.1+.</a:t>
+            </a:r>
+          </a:p>
+          <a:p>
+            <a:r>
+              <a:rPr lang="en-US" dirty="0" smtClean="0"/>
+              <a:t>Handle others in </a:t>
+            </a:r>
+            <a:r>
+              <a:rPr lang="en-US" dirty="0" err="1" smtClean="0"/>
+              <a:t>DataContext</a:t>
+            </a:r>
+            <a:r>
+              <a:rPr lang="en-US" dirty="0" smtClean="0"/>
+              <a:t> </a:t>
+            </a:r>
+            <a:r>
+              <a:rPr lang="en-US" dirty="0" err="1" smtClean="0"/>
+              <a:t>SaveChanges</a:t>
+            </a:r>
+            <a:r>
+              <a:rPr lang="en-US" dirty="0" smtClean="0"/>
+              <a:t> override</a:t>
             </a:r>
             <a:endParaRPr lang="en-US" dirty="0"/>
           </a:p>
@@ -3381,13 +3388,20 @@
     </p:spTree>
     <p:extLst>
       <p:ext uri="{BB962C8B-B14F-4D97-AF65-F5344CB8AC3E}">
-        <p14:creationId xmlns:p14="http://schemas.microsoft.com/office/powerpoint/2010/main" val="84800780"/>
+        <p14:creationId xmlns:p14="http://schemas.microsoft.com/office/powerpoint/2010/main" val="2327823055"/>
       </p:ext>
     </p:extLst>
   </p:cSld>
   <p:clrMapOvr>
     <a:masterClrMapping/>
   </p:clrMapOvr>
+  <p:timing>
+    <p:tnLst>
+      <p:par>
+        <p:cTn id="1" dur="indefinite" restart="never" nodeType="tmRoot"/>
+      </p:par>
+    </p:tnLst>
+  </p:timing>
 </p:sld>
 </file>
 
@@ -3424,8 +3438,8 @@
           <a:lstStyle/>
           <a:p>
             <a:r>
-              <a:rPr lang="en-US" dirty="0" smtClean="0"/>
-              <a:t>Logging Validation Errors</a:t>
+              <a:rPr lang="en-US" dirty="0" err="1" smtClean="0"/>
+              <a:t>EntityFramework.Extended</a:t>
             </a:r>
             <a:endParaRPr lang="en-US" dirty="0"/>
           </a:p>
@@ -3447,22 +3461,40 @@
           <a:lstStyle/>
           <a:p>
             <a:r>
-              <a:rPr lang="en-US" dirty="0" smtClean="0"/>
-              <a:t>ELMAH (and presumably other error logging frameworks) doesn’t log the details of validation exceptions by default</a:t>
-            </a:r>
-          </a:p>
-          <a:p>
-            <a:r>
-              <a:rPr lang="en-US" dirty="0" smtClean="0"/>
-              <a:t>You can override </a:t>
-            </a:r>
-            <a:r>
-              <a:rPr lang="en-US" dirty="0" err="1" smtClean="0"/>
-              <a:t>SaveChanges</a:t>
-            </a:r>
-            <a:r>
-              <a:rPr lang="en-US" dirty="0" smtClean="0"/>
-              <a:t> in your context, wrap the base call in try catch, and log the validation details</a:t>
+              <a:rPr lang="en-US" dirty="0"/>
+              <a:t>https://github.com/loresoft/EntityFramework.Extended</a:t>
+            </a:r>
+          </a:p>
+          <a:p>
+            <a:r>
+              <a:rPr lang="en-US" dirty="0" smtClean="0"/>
+              <a:t>Batch Delete and Updates</a:t>
+            </a:r>
+          </a:p>
+          <a:p>
+            <a:pPr lvl="1"/>
+            <a:r>
+              <a:rPr lang="en-US" dirty="0" smtClean="0"/>
+              <a:t>Bypasses Interceptors, so beware if using Soft Deletes</a:t>
+            </a:r>
+          </a:p>
+          <a:p>
+            <a:r>
+              <a:rPr lang="en-US" dirty="0" smtClean="0"/>
+              <a:t>Future Queries</a:t>
+            </a:r>
+          </a:p>
+          <a:p>
+            <a:pPr lvl="1"/>
+            <a:r>
+              <a:rPr lang="en-US" dirty="0" smtClean="0"/>
+              <a:t>Batches multiple statements into one round trip</a:t>
+            </a:r>
+          </a:p>
+          <a:p>
+            <a:r>
+              <a:rPr lang="en-US" dirty="0" smtClean="0"/>
+              <a:t>Audit Log</a:t>
             </a:r>
             <a:endParaRPr lang="en-US" dirty="0"/>
           </a:p>
@@ -3471,13 +3503,20 @@
     </p:spTree>
     <p:extLst>
       <p:ext uri="{BB962C8B-B14F-4D97-AF65-F5344CB8AC3E}">
-        <p14:creationId xmlns:p14="http://schemas.microsoft.com/office/powerpoint/2010/main" val="3211047059"/>
+        <p14:creationId xmlns:p14="http://schemas.microsoft.com/office/powerpoint/2010/main" val="84800780"/>
       </p:ext>
     </p:extLst>
   </p:cSld>
   <p:clrMapOvr>
     <a:masterClrMapping/>
   </p:clrMapOvr>
+  <p:timing>
+    <p:tnLst>
+      <p:par>
+        <p:cTn id="1" dur="indefinite" restart="never" nodeType="tmRoot"/>
+      </p:par>
+    </p:tnLst>
+  </p:timing>
 </p:sld>
 </file>
 
@@ -3515,7 +3554,7 @@
           <a:p>
             <a:r>
               <a:rPr lang="en-US" dirty="0" smtClean="0"/>
-              <a:t>Asynchronous Pattern Support</a:t>
+              <a:t>Logging Validation Errors</a:t>
             </a:r>
             <a:endParaRPr lang="en-US" dirty="0"/>
           </a:p>
@@ -3538,105 +3577,43 @@
           <a:p>
             <a:r>
               <a:rPr lang="en-US" dirty="0" smtClean="0"/>
-              <a:t>EF supports task-based </a:t>
+              <a:t>ELMAH (and presumably other error logging frameworks) doesn’t log the details of validation exceptions by default</a:t>
+            </a:r>
+          </a:p>
+          <a:p>
+            <a:r>
+              <a:rPr lang="en-US" dirty="0" smtClean="0"/>
+              <a:t>You can override </a:t>
             </a:r>
             <a:r>
               <a:rPr lang="en-US" dirty="0" err="1" smtClean="0"/>
-              <a:t>async</a:t>
-            </a:r>
-            <a:r>
-              <a:rPr lang="en-US" dirty="0" smtClean="0"/>
-              <a:t> pattern introduced in .NET 4.5.</a:t>
-            </a:r>
-          </a:p>
-          <a:p>
-            <a:r>
-              <a:rPr lang="en-US" dirty="0" smtClean="0"/>
-              <a:t>The following common methods are supported:</a:t>
-            </a:r>
-          </a:p>
-          <a:p>
-            <a:pPr lvl="1"/>
-            <a:r>
-              <a:rPr lang="en-US" dirty="0" err="1" smtClean="0"/>
-              <a:t>ToListAsync</a:t>
-            </a:r>
-            <a:r>
-              <a:rPr lang="en-US" dirty="0" smtClean="0"/>
-              <a:t>()</a:t>
-            </a:r>
-          </a:p>
-          <a:p>
-            <a:pPr lvl="1"/>
-            <a:r>
-              <a:rPr lang="en-US" dirty="0" err="1" smtClean="0"/>
-              <a:t>SingleOrDefaultAsync</a:t>
-            </a:r>
-            <a:r>
-              <a:rPr lang="en-US" dirty="0" smtClean="0"/>
-              <a:t>()</a:t>
-            </a:r>
-          </a:p>
-          <a:p>
-            <a:pPr lvl="1"/>
-            <a:r>
-              <a:rPr lang="en-US" dirty="0" err="1" smtClean="0"/>
-              <a:t>CountAsync</a:t>
-            </a:r>
-            <a:r>
-              <a:rPr lang="en-US" dirty="0" smtClean="0"/>
-              <a:t>()</a:t>
-            </a:r>
-          </a:p>
-          <a:p>
-            <a:pPr lvl="1"/>
-            <a:r>
-              <a:rPr lang="en-US" dirty="0" err="1" smtClean="0"/>
-              <a:t>SaveChangesAsync</a:t>
-            </a:r>
-            <a:r>
-              <a:rPr lang="en-US" dirty="0" smtClean="0"/>
-              <a:t>()</a:t>
+              <a:t>SaveChanges</a:t>
+            </a:r>
+            <a:r>
+              <a:rPr lang="en-US" dirty="0" smtClean="0"/>
+              <a:t> in your context, wrap the base call in try catch, and log the validation details</a:t>
             </a:r>
             <a:endParaRPr lang="en-US" dirty="0"/>
-          </a:p>
-          <a:p>
-            <a:r>
-              <a:rPr lang="en-US" dirty="0" smtClean="0"/>
-              <a:t>Raw queries also supported:</a:t>
-            </a:r>
-          </a:p>
-          <a:p>
-            <a:pPr lvl="1"/>
-            <a:r>
-              <a:rPr lang="en-US" dirty="0" err="1" smtClean="0"/>
-              <a:t>context.Database.SqlQuery</a:t>
-            </a:r>
-            <a:r>
-              <a:rPr lang="en-US" dirty="0" smtClean="0"/>
-              <a:t>&lt;Movie&gt;(“select * from movie”).</a:t>
-            </a:r>
-            <a:r>
-              <a:rPr lang="en-US" dirty="0" err="1" smtClean="0"/>
-              <a:t>ToListAsync</a:t>
-            </a:r>
-            <a:r>
-              <a:rPr lang="en-US" dirty="0" smtClean="0"/>
-              <a:t>()</a:t>
-            </a:r>
           </a:p>
         </p:txBody>
       </p:sp>
     </p:spTree>
     <p:extLst>
       <p:ext uri="{BB962C8B-B14F-4D97-AF65-F5344CB8AC3E}">
-        <p14:creationId xmlns:p14="http://schemas.microsoft.com/office/powerpoint/2010/main" val="1070994223"/>
+        <p14:creationId xmlns:p14="http://schemas.microsoft.com/office/powerpoint/2010/main" val="3211047059"/>
       </p:ext>
     </p:extLst>
   </p:cSld>
   <p:clrMapOvr>
     <a:masterClrMapping/>
   </p:clrMapOvr>
+  <p:timing>
+    <p:tnLst>
+      <p:par>
+        <p:cTn id="1" dur="indefinite" restart="never" nodeType="tmRoot"/>
+      </p:par>
+    </p:tnLst>
+  </p:timing>
 </p:sld>
 </file>
 
@@ -3674,7 +3651,7 @@
           <a:p>
             <a:r>
               <a:rPr lang="en-US" dirty="0" smtClean="0"/>
-              <a:t>Entity Framework Migrations</a:t>
+              <a:t>Asynchronous Pattern Support</a:t>
             </a:r>
             <a:endParaRPr lang="en-US" dirty="0"/>
           </a:p>
@@ -3692,88 +3669,96 @@
         </p:nvSpPr>
         <p:spPr/>
         <p:txBody>
-          <a:bodyPr>
-            <a:normAutofit fontScale="92500" lnSpcReduction="10000"/>
-          </a:bodyPr>
-          <a:lstStyle/>
-          <a:p>
-            <a:r>
-              <a:rPr lang="en-US" dirty="0" smtClean="0"/>
-              <a:t>Automatic Migrations are good for demos and prototypes, but generally not suitable for medium-large projects</a:t>
-            </a:r>
-          </a:p>
-          <a:p>
-            <a:r>
-              <a:rPr lang="en-US" dirty="0" smtClean="0"/>
-              <a:t>Custom Migrations</a:t>
+          <a:bodyPr/>
+          <a:lstStyle/>
+          <a:p>
+            <a:r>
+              <a:rPr lang="en-US" dirty="0" smtClean="0"/>
+              <a:t>EF supports task-based </a:t>
+            </a:r>
+            <a:r>
+              <a:rPr lang="en-US" dirty="0" err="1" smtClean="0"/>
+              <a:t>async</a:t>
+            </a:r>
+            <a:r>
+              <a:rPr lang="en-US" dirty="0" smtClean="0"/>
+              <a:t> pattern introduced in .NET 4.5.</a:t>
+            </a:r>
+          </a:p>
+          <a:p>
+            <a:r>
+              <a:rPr lang="en-US" dirty="0" smtClean="0"/>
+              <a:t>The following common methods are supported:</a:t>
             </a:r>
           </a:p>
           <a:p>
             <a:pPr lvl="1"/>
             <a:r>
-              <a:rPr lang="en-US" dirty="0" smtClean="0"/>
-              <a:t>Add </a:t>
-            </a:r>
-            <a:r>
               <a:rPr lang="en-US" dirty="0" err="1" smtClean="0"/>
-              <a:t>Movie.IsRecommended</a:t>
-            </a:r>
-            <a:r>
-              <a:rPr lang="en-US" dirty="0" smtClean="0"/>
-              <a:t> property</a:t>
+              <a:t>ToListAsync</a:t>
+            </a:r>
+            <a:r>
+              <a:rPr lang="en-US" dirty="0" smtClean="0"/>
+              <a:t>()</a:t>
             </a:r>
           </a:p>
           <a:p>
             <a:pPr lvl="1"/>
             <a:r>
-              <a:rPr lang="en-US" dirty="0" smtClean="0"/>
-              <a:t>Add Migration: add-migration </a:t>
-            </a:r>
-            <a:r>
               <a:rPr lang="en-US" dirty="0" err="1" smtClean="0"/>
-              <a:t>AddedMovieIsRecommended</a:t>
-            </a:r>
-            <a:endParaRPr lang="en-US" dirty="0" smtClean="0"/>
+              <a:t>SingleOrDefaultAsync</a:t>
+            </a:r>
+            <a:r>
+              <a:rPr lang="en-US" dirty="0" smtClean="0"/>
+              <a:t>()</a:t>
+            </a:r>
           </a:p>
           <a:p>
             <a:pPr lvl="1"/>
             <a:r>
-              <a:rPr lang="en-US" dirty="0" smtClean="0"/>
-              <a:t>Update Database: update-database</a:t>
+              <a:rPr lang="en-US" dirty="0" err="1" smtClean="0"/>
+              <a:t>CountAsync</a:t>
+            </a:r>
+            <a:r>
+              <a:rPr lang="en-US" dirty="0" smtClean="0"/>
+              <a:t>()</a:t>
             </a:r>
           </a:p>
           <a:p>
             <a:pPr lvl="1"/>
             <a:r>
-              <a:rPr lang="en-US" dirty="0" smtClean="0"/>
-              <a:t>Add </a:t>
-            </a:r>
-            <a:r>
               <a:rPr lang="en-US" dirty="0" err="1" smtClean="0"/>
-              <a:t>Actor.IsFavorite</a:t>
-            </a:r>
-            <a:r>
-              <a:rPr lang="en-US" dirty="0" smtClean="0"/>
-              <a:t> property</a:t>
-            </a:r>
-          </a:p>
-          <a:p>
-            <a:r>
-              <a:rPr lang="en-US" dirty="0" smtClean="0"/>
-              <a:t>Migrate.exe</a:t>
-            </a:r>
-          </a:p>
-          <a:p>
-            <a:r>
-              <a:rPr lang="en-US" dirty="0" smtClean="0"/>
-              <a:t>Migrations can have issues in a team environment. Better functionality was promised.</a:t>
+              <a:t>SaveChangesAsync</a:t>
+            </a:r>
+            <a:r>
+              <a:rPr lang="en-US" dirty="0" smtClean="0"/>
+              <a:t>()</a:t>
+            </a:r>
+            <a:endParaRPr lang="en-US" dirty="0"/>
+          </a:p>
+          <a:p>
+            <a:r>
+              <a:rPr lang="en-US" dirty="0" smtClean="0"/>
+              <a:t>Raw queries also supported:</a:t>
             </a:r>
           </a:p>
           <a:p>
             <a:pPr lvl="1"/>
             <a:r>
-              <a:rPr lang="en-US" dirty="0"/>
-              <a:t>More info: http://blogs.msdn.com/b/adonet/archive/2014/03/12/migrations-screencast-series.aspx</a:t>
+              <a:rPr lang="en-US" dirty="0" err="1" smtClean="0"/>
+              <a:t>context.Database.SqlQuery</a:t>
+            </a:r>
+            <a:r>
+              <a:rPr lang="en-US" dirty="0" smtClean="0"/>
+              <a:t>&lt;Movie&gt;(“select * from movie”).</a:t>
+            </a:r>
+            <a:r>
+              <a:rPr lang="en-US" dirty="0" err="1" smtClean="0"/>
+              <a:t>ToListAsync</a:t>
+            </a:r>
+            <a:r>
+              <a:rPr lang="en-US" dirty="0" smtClean="0"/>
+              <a:t>()</a:t>
             </a:r>
           </a:p>
         </p:txBody>
@@ -3781,13 +3766,20 @@
     </p:spTree>
     <p:extLst>
       <p:ext uri="{BB962C8B-B14F-4D97-AF65-F5344CB8AC3E}">
-        <p14:creationId xmlns:p14="http://schemas.microsoft.com/office/powerpoint/2010/main" val="932826416"/>
+        <p14:creationId xmlns:p14="http://schemas.microsoft.com/office/powerpoint/2010/main" val="1070994223"/>
       </p:ext>
     </p:extLst>
   </p:cSld>
   <p:clrMapOvr>
     <a:masterClrMapping/>
   </p:clrMapOvr>
+  <p:timing>
+    <p:tnLst>
+      <p:par>
+        <p:cTn id="1" dur="indefinite" restart="never" nodeType="tmRoot"/>
+      </p:par>
+    </p:tnLst>
+  </p:timing>
 </p:sld>
 </file>
 
@@ -3825,6 +3817,164 @@
           <a:p>
             <a:r>
               <a:rPr lang="en-US" dirty="0" smtClean="0"/>
+              <a:t>Entity Framework Migrations</a:t>
+            </a:r>
+            <a:endParaRPr lang="en-US" dirty="0"/>
+          </a:p>
+        </p:txBody>
+      </p:sp>
+      <p:sp>
+        <p:nvSpPr>
+          <p:cNvPr id="3" name="Content Placeholder 2"/>
+          <p:cNvSpPr>
+            <a:spLocks noGrp="1"/>
+          </p:cNvSpPr>
+          <p:nvPr>
+            <p:ph idx="1"/>
+          </p:nvPr>
+        </p:nvSpPr>
+        <p:spPr/>
+        <p:txBody>
+          <a:bodyPr>
+            <a:normAutofit fontScale="92500" lnSpcReduction="10000"/>
+          </a:bodyPr>
+          <a:lstStyle/>
+          <a:p>
+            <a:r>
+              <a:rPr lang="en-US" dirty="0" smtClean="0"/>
+              <a:t>Automatic Migrations are good for demos and prototypes, but generally not suitable for medium-large projects</a:t>
+            </a:r>
+          </a:p>
+          <a:p>
+            <a:r>
+              <a:rPr lang="en-US" dirty="0" smtClean="0"/>
+              <a:t>Custom Migrations</a:t>
+            </a:r>
+          </a:p>
+          <a:p>
+            <a:pPr lvl="1"/>
+            <a:r>
+              <a:rPr lang="en-US" dirty="0" smtClean="0"/>
+              <a:t>Add </a:t>
+            </a:r>
+            <a:r>
+              <a:rPr lang="en-US" dirty="0" err="1" smtClean="0"/>
+              <a:t>Movie.IsRecommended</a:t>
+            </a:r>
+            <a:r>
+              <a:rPr lang="en-US" dirty="0" smtClean="0"/>
+              <a:t> property</a:t>
+            </a:r>
+          </a:p>
+          <a:p>
+            <a:pPr lvl="1"/>
+            <a:r>
+              <a:rPr lang="en-US" dirty="0" smtClean="0"/>
+              <a:t>Add Migration: add-migration </a:t>
+            </a:r>
+            <a:r>
+              <a:rPr lang="en-US" dirty="0" err="1" smtClean="0"/>
+              <a:t>AddedMovieIsRecommended</a:t>
+            </a:r>
+            <a:endParaRPr lang="en-US" dirty="0" smtClean="0"/>
+          </a:p>
+          <a:p>
+            <a:pPr lvl="1"/>
+            <a:r>
+              <a:rPr lang="en-US" dirty="0" smtClean="0"/>
+              <a:t>Update Database: update-database</a:t>
+            </a:r>
+          </a:p>
+          <a:p>
+            <a:pPr lvl="1"/>
+            <a:r>
+              <a:rPr lang="en-US" dirty="0" smtClean="0"/>
+              <a:t>Add </a:t>
+            </a:r>
+            <a:r>
+              <a:rPr lang="en-US" dirty="0" err="1" smtClean="0"/>
+              <a:t>Actor.IsFavorite</a:t>
+            </a:r>
+            <a:r>
+              <a:rPr lang="en-US" dirty="0" smtClean="0"/>
+              <a:t> property</a:t>
+            </a:r>
+          </a:p>
+          <a:p>
+            <a:r>
+              <a:rPr lang="en-US" dirty="0" smtClean="0"/>
+              <a:t>Migrate.exe</a:t>
+            </a:r>
+          </a:p>
+          <a:p>
+            <a:r>
+              <a:rPr lang="en-US" dirty="0" smtClean="0"/>
+              <a:t>Migrations can have issues in a team environment. Better functionality was promised.</a:t>
+            </a:r>
+          </a:p>
+          <a:p>
+            <a:pPr lvl="1"/>
+            <a:r>
+              <a:rPr lang="en-US" dirty="0"/>
+              <a:t>More info: http://blogs.msdn.com/b/adonet/archive/2014/03/12/migrations-screencast-series.aspx</a:t>
+            </a:r>
+          </a:p>
+        </p:txBody>
+      </p:sp>
+    </p:spTree>
+    <p:extLst>
+      <p:ext uri="{BB962C8B-B14F-4D97-AF65-F5344CB8AC3E}">
+        <p14:creationId xmlns:p14="http://schemas.microsoft.com/office/powerpoint/2010/main" val="932826416"/>
+      </p:ext>
+    </p:extLst>
+  </p:cSld>
+  <p:clrMapOvr>
+    <a:masterClrMapping/>
+  </p:clrMapOvr>
+  <p:timing>
+    <p:tnLst>
+      <p:par>
+        <p:cTn id="1" dur="indefinite" restart="never" nodeType="tmRoot"/>
+      </p:par>
+    </p:tnLst>
+  </p:timing>
+</p:sld>
+</file>
+
+<file path=ppt/slides/slide16.xml><?xml version="1.0" encoding="utf-8"?>
+<p:sld xmlns:a="http://schemas.openxmlformats.org/drawingml/2006/main" xmlns:r="http://schemas.openxmlformats.org/officeDocument/2006/relationships" xmlns:p="http://schemas.openxmlformats.org/presentationml/2006/main">
+  <p:cSld>
+    <p:spTree>
+      <p:nvGrpSpPr>
+        <p:cNvPr id="1" name=""/>
+        <p:cNvGrpSpPr/>
+        <p:nvPr/>
+      </p:nvGrpSpPr>
+      <p:grpSpPr>
+        <a:xfrm>
+          <a:off x="0" y="0"/>
+          <a:ext cx="0" cy="0"/>
+          <a:chOff x="0" y="0"/>
+          <a:chExt cx="0" cy="0"/>
+        </a:xfrm>
+      </p:grpSpPr>
+      <p:sp>
+        <p:nvSpPr>
+          <p:cNvPr id="2" name="Title 1"/>
+          <p:cNvSpPr>
+            <a:spLocks noGrp="1"/>
+          </p:cNvSpPr>
+          <p:nvPr>
+            <p:ph type="title"/>
+          </p:nvPr>
+        </p:nvSpPr>
+        <p:spPr/>
+        <p:txBody>
+          <a:bodyPr/>
+          <a:lstStyle/>
+          <a:p>
+            <a:r>
+              <a:rPr lang="en-US" dirty="0" smtClean="0"/>
               <a:t>Where Can I Learn More?</a:t>
             </a:r>
             <a:endParaRPr lang="en-US" dirty="0"/>
@@ -3955,6 +4105,13 @@
   <p:clrMapOvr>
     <a:masterClrMapping/>
   </p:clrMapOvr>
+  <p:timing>
+    <p:tnLst>
+      <p:par>
+        <p:cTn id="1" dur="indefinite" restart="never" nodeType="tmRoot"/>
+      </p:par>
+    </p:tnLst>
+  </p:timing>
 </p:sld>
 </file>
 
@@ -6185,7 +6342,7 @@
             <a:spLocks noGrp="1"/>
           </p:cNvSpPr>
           <p:nvPr>
-            <p:ph type="ctrTitle"/>
+            <p:ph type="title"/>
           </p:nvPr>
         </p:nvSpPr>
         <p:spPr/>
@@ -6195,7 +6352,7 @@
           <a:p>
             <a:r>
               <a:rPr lang="en-US" dirty="0" smtClean="0"/>
-              <a:t>General Tips, Tricks, Best Practices, Opinions</a:t>
+              <a:t>But….</a:t>
             </a:r>
             <a:endParaRPr lang="en-US" dirty="0"/>
           </a:p>
@@ -6203,12 +6360,12 @@
       </p:sp>
       <p:sp>
         <p:nvSpPr>
-          <p:cNvPr id="3" name="Subtitle 2"/>
-          <p:cNvSpPr>
-            <a:spLocks noGrp="1"/>
-          </p:cNvSpPr>
-          <p:nvPr>
-            <p:ph type="subTitle" idx="1"/>
+          <p:cNvPr id="3" name="Content Placeholder 2"/>
+          <p:cNvSpPr>
+            <a:spLocks noGrp="1"/>
+          </p:cNvSpPr>
+          <p:nvPr>
+            <p:ph idx="1"/>
           </p:nvPr>
         </p:nvSpPr>
         <p:spPr/>
@@ -6216,20 +6373,87 @@
           <a:bodyPr/>
           <a:lstStyle/>
           <a:p>
+            <a:r>
+              <a:rPr lang="en-US" dirty="0" smtClean="0"/>
+              <a:t>Version 7 Uncertainty</a:t>
+            </a:r>
+          </a:p>
+          <a:p>
+            <a:pPr lvl="1"/>
+            <a:r>
+              <a:rPr lang="en-US" dirty="0" smtClean="0"/>
+              <a:t>Feature churn</a:t>
+            </a:r>
+          </a:p>
+          <a:p>
+            <a:pPr lvl="1"/>
+            <a:r>
+              <a:rPr lang="en-US" dirty="0" smtClean="0"/>
+              <a:t>Timeline?</a:t>
+            </a:r>
+          </a:p>
+          <a:p>
+            <a:pPr lvl="1"/>
+            <a:r>
+              <a:rPr lang="en-US" dirty="0" smtClean="0"/>
+              <a:t>Lack of communication</a:t>
+            </a:r>
+          </a:p>
+          <a:p>
+            <a:pPr lvl="1"/>
+            <a:r>
+              <a:rPr lang="en-US" dirty="0" smtClean="0"/>
+              <a:t>???</a:t>
+            </a:r>
             <a:endParaRPr lang="en-US" dirty="0" smtClean="0"/>
           </a:p>
-          <a:p>
-            <a:r>
-              <a:rPr lang="en-US" dirty="0"/>
-              <a:t>Code Samples: https://github.com/mikecole/MovieFanatic</a:t>
-            </a:r>
-          </a:p>
-        </p:txBody>
-      </p:sp>
+        </p:txBody>
+      </p:sp>
+      <p:pic>
+        <p:nvPicPr>
+          <p:cNvPr id="1030" name="Picture 6" descr="http://i.kinja-img.com/gawker-media/image/upload/s--GJpMlXy4--/18tdaxxfe4kb7jpg.jpg"/>
+          <p:cNvPicPr>
+            <a:picLocks noChangeAspect="1" noChangeArrowheads="1"/>
+          </p:cNvPicPr>
+          <p:nvPr/>
+        </p:nvPicPr>
+        <p:blipFill>
+          <a:blip r:embed="rId2">
+            <a:extLst>
+              <a:ext uri="{28A0092B-C50C-407E-A947-70E740481C1C}">
+                <a14:useLocalDpi xmlns:a14="http://schemas.microsoft.com/office/drawing/2010/main" val="0"/>
+              </a:ext>
+            </a:extLst>
+          </a:blip>
+          <a:srcRect/>
+          <a:stretch>
+            <a:fillRect/>
+          </a:stretch>
+        </p:blipFill>
+        <p:spPr bwMode="auto">
+          <a:xfrm>
+            <a:off x="6599918" y="1153749"/>
+            <a:ext cx="3638550" cy="4876801"/>
+          </a:xfrm>
+          <a:prstGeom prst="rect">
+            <a:avLst/>
+          </a:prstGeom>
+          <a:noFill/>
+          <a:extLst>
+            <a:ext uri="{909E8E84-426E-40DD-AFC4-6F175D3DCCD1}">
+              <a14:hiddenFill xmlns:a14="http://schemas.microsoft.com/office/drawing/2010/main">
+                <a:solidFill>
+                  <a:srgbClr val="FFFFFF"/>
+                </a:solidFill>
+              </a14:hiddenFill>
+            </a:ext>
+          </a:extLst>
+        </p:spPr>
+      </p:pic>
     </p:spTree>
     <p:extLst>
       <p:ext uri="{BB962C8B-B14F-4D97-AF65-F5344CB8AC3E}">
-        <p14:creationId xmlns:p14="http://schemas.microsoft.com/office/powerpoint/2010/main" val="2804395721"/>
+        <p14:creationId xmlns:p14="http://schemas.microsoft.com/office/powerpoint/2010/main" val="722927078"/>
       </p:ext>
     </p:extLst>
   </p:cSld>
@@ -6239,7 +6463,275 @@
   <p:timing>
     <p:tnLst>
       <p:par>
-        <p:cTn id="1" dur="indefinite" restart="never" nodeType="tmRoot"/>
+        <p:cTn id="1" dur="indefinite" restart="never" nodeType="tmRoot">
+          <p:childTnLst>
+            <p:seq concurrent="1" nextAc="seek">
+              <p:cTn id="2" dur="indefinite" nodeType="mainSeq">
+                <p:childTnLst>
+                  <p:par>
+                    <p:cTn id="3" fill="hold">
+                      <p:stCondLst>
+                        <p:cond delay="indefinite"/>
+                      </p:stCondLst>
+                      <p:childTnLst>
+                        <p:par>
+                          <p:cTn id="4" fill="hold">
+                            <p:stCondLst>
+                              <p:cond delay="0"/>
+                            </p:stCondLst>
+                            <p:childTnLst>
+                              <p:par>
+                                <p:cTn id="5" presetID="1" presetClass="entr" presetSubtype="0" fill="hold" nodeType="clickEffect">
+                                  <p:stCondLst>
+                                    <p:cond delay="0"/>
+                                  </p:stCondLst>
+                                  <p:childTnLst>
+                                    <p:set>
+                                      <p:cBhvr>
+                                        <p:cTn id="6" dur="1" fill="hold">
+                                          <p:stCondLst>
+                                            <p:cond delay="0"/>
+                                          </p:stCondLst>
+                                        </p:cTn>
+                                        <p:tgtEl>
+                                          <p:spTgt spid="3">
+                                            <p:txEl>
+                                              <p:pRg st="0" end="0"/>
+                                            </p:txEl>
+                                          </p:spTgt>
+                                        </p:tgtEl>
+                                        <p:attrNameLst>
+                                          <p:attrName>style.visibility</p:attrName>
+                                        </p:attrNameLst>
+                                      </p:cBhvr>
+                                      <p:to>
+                                        <p:strVal val="visible"/>
+                                      </p:to>
+                                    </p:set>
+                                  </p:childTnLst>
+                                </p:cTn>
+                              </p:par>
+                            </p:childTnLst>
+                          </p:cTn>
+                        </p:par>
+                      </p:childTnLst>
+                    </p:cTn>
+                  </p:par>
+                  <p:par>
+                    <p:cTn id="7" fill="hold">
+                      <p:stCondLst>
+                        <p:cond delay="indefinite"/>
+                      </p:stCondLst>
+                      <p:childTnLst>
+                        <p:par>
+                          <p:cTn id="8" fill="hold">
+                            <p:stCondLst>
+                              <p:cond delay="0"/>
+                            </p:stCondLst>
+                            <p:childTnLst>
+                              <p:par>
+                                <p:cTn id="9" presetID="1" presetClass="entr" presetSubtype="0" fill="hold" nodeType="clickEffect">
+                                  <p:stCondLst>
+                                    <p:cond delay="0"/>
+                                  </p:stCondLst>
+                                  <p:childTnLst>
+                                    <p:set>
+                                      <p:cBhvr>
+                                        <p:cTn id="10" dur="1" fill="hold">
+                                          <p:stCondLst>
+                                            <p:cond delay="0"/>
+                                          </p:stCondLst>
+                                        </p:cTn>
+                                        <p:tgtEl>
+                                          <p:spTgt spid="3">
+                                            <p:txEl>
+                                              <p:pRg st="1" end="1"/>
+                                            </p:txEl>
+                                          </p:spTgt>
+                                        </p:tgtEl>
+                                        <p:attrNameLst>
+                                          <p:attrName>style.visibility</p:attrName>
+                                        </p:attrNameLst>
+                                      </p:cBhvr>
+                                      <p:to>
+                                        <p:strVal val="visible"/>
+                                      </p:to>
+                                    </p:set>
+                                  </p:childTnLst>
+                                </p:cTn>
+                              </p:par>
+                            </p:childTnLst>
+                          </p:cTn>
+                        </p:par>
+                      </p:childTnLst>
+                    </p:cTn>
+                  </p:par>
+                  <p:par>
+                    <p:cTn id="11" fill="hold">
+                      <p:stCondLst>
+                        <p:cond delay="indefinite"/>
+                      </p:stCondLst>
+                      <p:childTnLst>
+                        <p:par>
+                          <p:cTn id="12" fill="hold">
+                            <p:stCondLst>
+                              <p:cond delay="0"/>
+                            </p:stCondLst>
+                            <p:childTnLst>
+                              <p:par>
+                                <p:cTn id="13" presetID="1" presetClass="entr" presetSubtype="0" fill="hold" nodeType="clickEffect">
+                                  <p:stCondLst>
+                                    <p:cond delay="0"/>
+                                  </p:stCondLst>
+                                  <p:childTnLst>
+                                    <p:set>
+                                      <p:cBhvr>
+                                        <p:cTn id="14" dur="1" fill="hold">
+                                          <p:stCondLst>
+                                            <p:cond delay="0"/>
+                                          </p:stCondLst>
+                                        </p:cTn>
+                                        <p:tgtEl>
+                                          <p:spTgt spid="3">
+                                            <p:txEl>
+                                              <p:pRg st="2" end="2"/>
+                                            </p:txEl>
+                                          </p:spTgt>
+                                        </p:tgtEl>
+                                        <p:attrNameLst>
+                                          <p:attrName>style.visibility</p:attrName>
+                                        </p:attrNameLst>
+                                      </p:cBhvr>
+                                      <p:to>
+                                        <p:strVal val="visible"/>
+                                      </p:to>
+                                    </p:set>
+                                  </p:childTnLst>
+                                </p:cTn>
+                              </p:par>
+                            </p:childTnLst>
+                          </p:cTn>
+                        </p:par>
+                      </p:childTnLst>
+                    </p:cTn>
+                  </p:par>
+                  <p:par>
+                    <p:cTn id="15" fill="hold">
+                      <p:stCondLst>
+                        <p:cond delay="indefinite"/>
+                      </p:stCondLst>
+                      <p:childTnLst>
+                        <p:par>
+                          <p:cTn id="16" fill="hold">
+                            <p:stCondLst>
+                              <p:cond delay="0"/>
+                            </p:stCondLst>
+                            <p:childTnLst>
+                              <p:par>
+                                <p:cTn id="17" presetID="1" presetClass="entr" presetSubtype="0" fill="hold" nodeType="clickEffect">
+                                  <p:stCondLst>
+                                    <p:cond delay="0"/>
+                                  </p:stCondLst>
+                                  <p:childTnLst>
+                                    <p:set>
+                                      <p:cBhvr>
+                                        <p:cTn id="18" dur="1" fill="hold">
+                                          <p:stCondLst>
+                                            <p:cond delay="0"/>
+                                          </p:stCondLst>
+                                        </p:cTn>
+                                        <p:tgtEl>
+                                          <p:spTgt spid="3">
+                                            <p:txEl>
+                                              <p:pRg st="3" end="3"/>
+                                            </p:txEl>
+                                          </p:spTgt>
+                                        </p:tgtEl>
+                                        <p:attrNameLst>
+                                          <p:attrName>style.visibility</p:attrName>
+                                        </p:attrNameLst>
+                                      </p:cBhvr>
+                                      <p:to>
+                                        <p:strVal val="visible"/>
+                                      </p:to>
+                                    </p:set>
+                                  </p:childTnLst>
+                                </p:cTn>
+                              </p:par>
+                            </p:childTnLst>
+                          </p:cTn>
+                        </p:par>
+                      </p:childTnLst>
+                    </p:cTn>
+                  </p:par>
+                  <p:par>
+                    <p:cTn id="19" fill="hold">
+                      <p:stCondLst>
+                        <p:cond delay="indefinite"/>
+                      </p:stCondLst>
+                      <p:childTnLst>
+                        <p:par>
+                          <p:cTn id="20" fill="hold">
+                            <p:stCondLst>
+                              <p:cond delay="0"/>
+                            </p:stCondLst>
+                            <p:childTnLst>
+                              <p:par>
+                                <p:cTn id="21" presetID="1" presetClass="entr" presetSubtype="0" fill="hold" nodeType="clickEffect">
+                                  <p:stCondLst>
+                                    <p:cond delay="0"/>
+                                  </p:stCondLst>
+                                  <p:childTnLst>
+                                    <p:set>
+                                      <p:cBhvr>
+                                        <p:cTn id="22" dur="1" fill="hold">
+                                          <p:stCondLst>
+                                            <p:cond delay="0"/>
+                                          </p:stCondLst>
+                                        </p:cTn>
+                                        <p:tgtEl>
+                                          <p:spTgt spid="3">
+                                            <p:txEl>
+                                              <p:pRg st="4" end="4"/>
+                                            </p:txEl>
+                                          </p:spTgt>
+                                        </p:tgtEl>
+                                        <p:attrNameLst>
+                                          <p:attrName>style.visibility</p:attrName>
+                                        </p:attrNameLst>
+                                      </p:cBhvr>
+                                      <p:to>
+                                        <p:strVal val="visible"/>
+                                      </p:to>
+                                    </p:set>
+                                  </p:childTnLst>
+                                </p:cTn>
+                              </p:par>
+                            </p:childTnLst>
+                          </p:cTn>
+                        </p:par>
+                      </p:childTnLst>
+                    </p:cTn>
+                  </p:par>
+                </p:childTnLst>
+              </p:cTn>
+              <p:prevCondLst>
+                <p:cond evt="onPrev" delay="0">
+                  <p:tgtEl>
+                    <p:sldTgt/>
+                  </p:tgtEl>
+                </p:cond>
+              </p:prevCondLst>
+              <p:nextCondLst>
+                <p:cond evt="onNext" delay="0">
+                  <p:tgtEl>
+                    <p:sldTgt/>
+                  </p:tgtEl>
+                </p:cond>
+              </p:nextCondLst>
+            </p:seq>
+          </p:childTnLst>
+        </p:cTn>
       </p:par>
     </p:tnLst>
   </p:timing>
@@ -6270,7 +6762,7 @@
             <a:spLocks noGrp="1"/>
           </p:cNvSpPr>
           <p:nvPr>
-            <p:ph type="title"/>
+            <p:ph type="ctrTitle"/>
           </p:nvPr>
         </p:nvSpPr>
         <p:spPr/>
@@ -6280,7 +6772,7 @@
           <a:p>
             <a:r>
               <a:rPr lang="en-US" dirty="0" smtClean="0"/>
-              <a:t>Profile Your Queries</a:t>
+              <a:t>General Tips, Tricks, Best Practices, Opinions</a:t>
             </a:r>
             <a:endParaRPr lang="en-US" dirty="0"/>
           </a:p>
@@ -6288,12 +6780,12 @@
       </p:sp>
       <p:sp>
         <p:nvSpPr>
-          <p:cNvPr id="3" name="Content Placeholder 2"/>
-          <p:cNvSpPr>
-            <a:spLocks noGrp="1"/>
-          </p:cNvSpPr>
-          <p:nvPr>
-            <p:ph idx="1"/>
+          <p:cNvPr id="3" name="Subtitle 2"/>
+          <p:cNvSpPr>
+            <a:spLocks noGrp="1"/>
+          </p:cNvSpPr>
+          <p:nvPr>
+            <p:ph type="subTitle" idx="1"/>
           </p:nvPr>
         </p:nvSpPr>
         <p:spPr/>
@@ -6301,44 +6793,20 @@
           <a:bodyPr/>
           <a:lstStyle/>
           <a:p>
-            <a:r>
-              <a:rPr lang="en-US" dirty="0" smtClean="0"/>
-              <a:t>Database connectivity is generally one of the most time intensive operations</a:t>
-            </a:r>
-          </a:p>
-          <a:p>
-            <a:r>
-              <a:rPr lang="en-US" dirty="0" smtClean="0"/>
-              <a:t>A single stray .</a:t>
-            </a:r>
-            <a:r>
-              <a:rPr lang="en-US" dirty="0" err="1" smtClean="0"/>
-              <a:t>ToList</a:t>
-            </a:r>
-            <a:r>
-              <a:rPr lang="en-US" dirty="0" smtClean="0"/>
-              <a:t>() could throw off your intended query</a:t>
-            </a:r>
-          </a:p>
-          <a:p>
-            <a:r>
-              <a:rPr lang="en-US" dirty="0" smtClean="0"/>
-              <a:t>Very helpful with maintaining code</a:t>
-            </a:r>
-          </a:p>
-          <a:p>
-            <a:r>
-              <a:rPr lang="en-US" dirty="0" err="1" smtClean="0"/>
-              <a:t>EFProf</a:t>
-            </a:r>
-            <a:endParaRPr lang="en-US" dirty="0"/>
+            <a:endParaRPr lang="en-US" dirty="0" smtClean="0"/>
+          </a:p>
+          <a:p>
+            <a:r>
+              <a:rPr lang="en-US" dirty="0"/>
+              <a:t>Code Samples: https://github.com/mikecole/MovieFanatic</a:t>
+            </a:r>
           </a:p>
         </p:txBody>
       </p:sp>
     </p:spTree>
     <p:extLst>
       <p:ext uri="{BB962C8B-B14F-4D97-AF65-F5344CB8AC3E}">
-        <p14:creationId xmlns:p14="http://schemas.microsoft.com/office/powerpoint/2010/main" val="803387472"/>
+        <p14:creationId xmlns:p14="http://schemas.microsoft.com/office/powerpoint/2010/main" val="2804395721"/>
       </p:ext>
     </p:extLst>
   </p:cSld>
@@ -6389,119 +6857,65 @@
           <a:p>
             <a:r>
               <a:rPr lang="en-US" dirty="0" smtClean="0"/>
-              <a:t>Managing </a:t>
+              <a:t>Profile Your Queries</a:t>
+            </a:r>
+            <a:endParaRPr lang="en-US" dirty="0"/>
+          </a:p>
+        </p:txBody>
+      </p:sp>
+      <p:sp>
+        <p:nvSpPr>
+          <p:cNvPr id="3" name="Content Placeholder 2"/>
+          <p:cNvSpPr>
+            <a:spLocks noGrp="1"/>
+          </p:cNvSpPr>
+          <p:nvPr>
+            <p:ph idx="1"/>
+          </p:nvPr>
+        </p:nvSpPr>
+        <p:spPr/>
+        <p:txBody>
+          <a:bodyPr/>
+          <a:lstStyle/>
+          <a:p>
+            <a:r>
+              <a:rPr lang="en-US" dirty="0" smtClean="0"/>
+              <a:t>Database connectivity is generally one of the most time intensive operations</a:t>
+            </a:r>
+          </a:p>
+          <a:p>
+            <a:r>
+              <a:rPr lang="en-US" dirty="0" smtClean="0"/>
+              <a:t>A single stray .</a:t>
             </a:r>
             <a:r>
               <a:rPr lang="en-US" dirty="0" err="1" smtClean="0"/>
-              <a:t>DataContext</a:t>
-            </a:r>
-            <a:r>
-              <a:rPr lang="en-US" dirty="0" smtClean="0"/>
-              <a:t> Lifetime</a:t>
+              <a:t>ToList</a:t>
+            </a:r>
+            <a:r>
+              <a:rPr lang="en-US" dirty="0" smtClean="0"/>
+              <a:t>() could throw off your intended query</a:t>
+            </a:r>
+          </a:p>
+          <a:p>
+            <a:r>
+              <a:rPr lang="en-US" dirty="0" smtClean="0"/>
+              <a:t>Very helpful with maintaining code</a:t>
+            </a:r>
+          </a:p>
+          <a:p>
+            <a:r>
+              <a:rPr lang="en-US" dirty="0" err="1" smtClean="0"/>
+              <a:t>EFProf</a:t>
             </a:r>
             <a:endParaRPr lang="en-US" dirty="0"/>
-          </a:p>
-        </p:txBody>
-      </p:sp>
-      <p:sp>
-        <p:nvSpPr>
-          <p:cNvPr id="3" name="Content Placeholder 2"/>
-          <p:cNvSpPr>
-            <a:spLocks noGrp="1"/>
-          </p:cNvSpPr>
-          <p:nvPr>
-            <p:ph idx="1"/>
-          </p:nvPr>
-        </p:nvSpPr>
-        <p:spPr/>
-        <p:txBody>
-          <a:bodyPr/>
-          <a:lstStyle/>
-          <a:p>
-            <a:r>
-              <a:rPr lang="en-US" dirty="0" smtClean="0"/>
-              <a:t>Don’t simply wrap your context with using statements</a:t>
-            </a:r>
-          </a:p>
-          <a:p>
-            <a:r>
-              <a:rPr lang="en-US" dirty="0" smtClean="0"/>
-              <a:t>Unit </a:t>
-            </a:r>
-            <a:r>
-              <a:rPr lang="en-US" dirty="0"/>
-              <a:t>of Work pattern is a good </a:t>
-            </a:r>
-            <a:r>
-              <a:rPr lang="en-US" dirty="0" smtClean="0"/>
-              <a:t>approach</a:t>
-            </a:r>
-          </a:p>
-          <a:p>
-            <a:r>
-              <a:rPr lang="en-US" dirty="0" smtClean="0"/>
-              <a:t>Lean towards using your </a:t>
-            </a:r>
-            <a:r>
-              <a:rPr lang="en-US" dirty="0" err="1" smtClean="0"/>
-              <a:t>IoC</a:t>
-            </a:r>
-            <a:r>
-              <a:rPr lang="en-US" dirty="0" smtClean="0"/>
-              <a:t>  tool to manage lifetime</a:t>
-            </a:r>
-          </a:p>
-          <a:p>
-            <a:pPr lvl="1"/>
-            <a:r>
-              <a:rPr lang="en-US" dirty="0" err="1" smtClean="0"/>
-              <a:t>StructureMap</a:t>
-            </a:r>
-            <a:r>
-              <a:rPr lang="en-US" dirty="0" smtClean="0"/>
-              <a:t> has </a:t>
-            </a:r>
-            <a:r>
-              <a:rPr lang="en-US" dirty="0" err="1" smtClean="0"/>
-              <a:t>SessionPerHttpRequest</a:t>
-            </a:r>
-            <a:r>
-              <a:rPr lang="en-US" dirty="0" smtClean="0"/>
-              <a:t> scope, newer versions have nested containers and transient scope</a:t>
-            </a:r>
-          </a:p>
-          <a:p>
-            <a:pPr lvl="1"/>
-            <a:r>
-              <a:rPr lang="en-US" dirty="0" smtClean="0"/>
-              <a:t>Unity has </a:t>
-            </a:r>
-            <a:r>
-              <a:rPr lang="en-US" dirty="0" err="1" smtClean="0"/>
-              <a:t>PerRequestLifetimeManager</a:t>
-            </a:r>
-            <a:endParaRPr lang="en-US" dirty="0" smtClean="0"/>
-          </a:p>
-          <a:p>
-            <a:r>
-              <a:rPr lang="en-US" dirty="0" smtClean="0"/>
-              <a:t>DISPOSE your </a:t>
-            </a:r>
-            <a:r>
-              <a:rPr lang="en-US" dirty="0" err="1" smtClean="0"/>
-              <a:t>DataContext</a:t>
-            </a:r>
-            <a:r>
-              <a:rPr lang="en-US" dirty="0" smtClean="0"/>
-              <a:t> when finished</a:t>
-            </a:r>
           </a:p>
         </p:txBody>
       </p:sp>
     </p:spTree>
     <p:extLst>
       <p:ext uri="{BB962C8B-B14F-4D97-AF65-F5344CB8AC3E}">
-        <p14:creationId xmlns:p14="http://schemas.microsoft.com/office/powerpoint/2010/main" val="491338733"/>
+        <p14:creationId xmlns:p14="http://schemas.microsoft.com/office/powerpoint/2010/main" val="803387472"/>
       </p:ext>
     </p:extLst>
   </p:cSld>
@@ -6552,15 +6966,15 @@
           <a:p>
             <a:r>
               <a:rPr lang="en-US" dirty="0" smtClean="0"/>
-              <a:t>Use </a:t>
+              <a:t>Managing </a:t>
             </a:r>
             <a:r>
               <a:rPr lang="en-US" dirty="0" err="1" smtClean="0"/>
-              <a:t>AutoMapper</a:t>
-            </a:r>
-            <a:r>
-              <a:rPr lang="en-US" dirty="0" smtClean="0"/>
-              <a:t> Projections</a:t>
+              <a:t>DataContext</a:t>
+            </a:r>
+            <a:r>
+              <a:rPr lang="en-US" dirty="0" smtClean="0"/>
+              <a:t> Lifetime</a:t>
             </a:r>
             <a:endParaRPr lang="en-US" dirty="0"/>
           </a:p>
@@ -6583,30 +6997,80 @@
           <a:p>
             <a:r>
               <a:rPr lang="en-US" dirty="0" smtClean="0"/>
-              <a:t>Alternative to explicitly using Include statements</a:t>
+              <a:t>Don’t simply wrap your context with using statements</a:t>
+            </a:r>
+          </a:p>
+          <a:p>
+            <a:r>
+              <a:rPr lang="en-US" dirty="0" smtClean="0"/>
+              <a:t>Unit </a:t>
+            </a:r>
+            <a:r>
+              <a:rPr lang="en-US" dirty="0"/>
+              <a:t>of Work pattern is a good </a:t>
+            </a:r>
+            <a:r>
+              <a:rPr lang="en-US" dirty="0" smtClean="0"/>
+              <a:t>approach</a:t>
+            </a:r>
+          </a:p>
+          <a:p>
+            <a:r>
+              <a:rPr lang="en-US" dirty="0" smtClean="0"/>
+              <a:t>Lean towards using your </a:t>
+            </a:r>
+            <a:r>
+              <a:rPr lang="en-US" dirty="0" err="1" smtClean="0"/>
+              <a:t>IoC</a:t>
+            </a:r>
+            <a:r>
+              <a:rPr lang="en-US" dirty="0" smtClean="0"/>
+              <a:t>  tool to manage lifetime</a:t>
             </a:r>
           </a:p>
           <a:p>
             <a:pPr lvl="1"/>
             <a:r>
-              <a:rPr lang="en-US" dirty="0" smtClean="0"/>
-              <a:t>Ensures you don’t use additional data elements and forget to modify Includes</a:t>
-            </a:r>
-          </a:p>
-          <a:p>
-            <a:r>
-              <a:rPr lang="en-US" dirty="0" smtClean="0"/>
-              <a:t>Side effect: Generate SQL only selects fields needed, instead of SELECT *</a:t>
-            </a:r>
-          </a:p>
-          <a:p>
-            <a:r>
-              <a:rPr lang="en-US" dirty="0" smtClean="0"/>
-              <a:t>More </a:t>
-            </a:r>
-            <a:r>
-              <a:rPr lang="en-US" dirty="0"/>
-              <a:t>Info: http://lostechies.com/jimmybogard/2014/04/03/using-automapper-to-prevent-select-n1-problems/</a:t>
+              <a:rPr lang="en-US" dirty="0" err="1" smtClean="0"/>
+              <a:t>StructureMap</a:t>
+            </a:r>
+            <a:r>
+              <a:rPr lang="en-US" dirty="0" smtClean="0"/>
+              <a:t> has </a:t>
+            </a:r>
+            <a:r>
+              <a:rPr lang="en-US" dirty="0" err="1" smtClean="0"/>
+              <a:t>SessionPerHttpRequest</a:t>
+            </a:r>
+            <a:r>
+              <a:rPr lang="en-US" dirty="0" smtClean="0"/>
+              <a:t> scope, newer versions have nested containers and transient scope</a:t>
+            </a:r>
+          </a:p>
+          <a:p>
+            <a:pPr lvl="1"/>
+            <a:r>
+              <a:rPr lang="en-US" dirty="0" smtClean="0"/>
+              <a:t>Unity has </a:t>
+            </a:r>
+            <a:r>
+              <a:rPr lang="en-US" dirty="0" err="1" smtClean="0"/>
+              <a:t>PerRequestLifetimeManager</a:t>
+            </a:r>
+            <a:endParaRPr lang="en-US" dirty="0" smtClean="0"/>
+          </a:p>
+          <a:p>
+            <a:r>
+              <a:rPr lang="en-US" dirty="0" smtClean="0"/>
+              <a:t>DISPOSE your </a:t>
+            </a:r>
+            <a:r>
+              <a:rPr lang="en-US" dirty="0" err="1" smtClean="0"/>
+              <a:t>DataContext</a:t>
+            </a:r>
+            <a:r>
+              <a:rPr lang="en-US" dirty="0" smtClean="0"/>
+              <a:t> when finished</a:t>
             </a:r>
           </a:p>
         </p:txBody>
@@ -6614,13 +7078,20 @@
     </p:spTree>
     <p:extLst>
       <p:ext uri="{BB962C8B-B14F-4D97-AF65-F5344CB8AC3E}">
-        <p14:creationId xmlns:p14="http://schemas.microsoft.com/office/powerpoint/2010/main" val="2386748387"/>
+        <p14:creationId xmlns:p14="http://schemas.microsoft.com/office/powerpoint/2010/main" val="491338733"/>
       </p:ext>
     </p:extLst>
   </p:cSld>
   <p:clrMapOvr>
     <a:masterClrMapping/>
   </p:clrMapOvr>
+  <p:timing>
+    <p:tnLst>
+      <p:par>
+        <p:cTn id="1" dur="indefinite" restart="never" nodeType="tmRoot"/>
+      </p:par>
+    </p:tnLst>
+  </p:timing>
 </p:sld>
 </file>
 

</xml_diff>